<commit_message>
This is the officially good powerpoint project proposal
</commit_message>
<xml_diff>
--- a/JorgeFTito_ENGI301_project_proposal.pptx
+++ b/JorgeFTito_ENGI301_project_proposal.pptx
@@ -221,7 +221,7 @@
           <a:p>
             <a:fld id="{59041DB8-B66F-4DC8-A96E-33677E0F90FF}" type="datetimeFigureOut">
               <a:rPr lang="en-US" smtClean="0"/>
-              <a:t>10/24/2019</a:t>
+              <a:t>11/18/2019</a:t>
             </a:fld>
             <a:endParaRPr lang="en-US"/>
           </a:p>
@@ -386,7 +386,7 @@
           <a:p>
             <a:fld id="{DEB49C4A-65AC-492D-9701-81B46C3AD0E4}" type="datetimeFigureOut">
               <a:rPr lang="en-US" smtClean="0"/>
-              <a:t>10/24/2019</a:t>
+              <a:t>11/18/2019</a:t>
             </a:fld>
             <a:endParaRPr lang="en-US"/>
           </a:p>
@@ -2794,7 +2794,7 @@
           <a:p>
             <a:fld id="{384A29A4-78C8-47AB-BA06-22CB45938951}" type="datetime1">
               <a:rPr lang="en-US" smtClean="0"/>
-              <a:t>10/24/2019</a:t>
+              <a:t>11/18/2019</a:t>
             </a:fld>
             <a:endParaRPr lang="en-US"/>
           </a:p>
@@ -2989,7 +2989,7 @@
           <a:p>
             <a:fld id="{E1ED4ACF-2D82-46F2-A8E9-23963AA34E86}" type="datetime1">
               <a:rPr lang="en-US" smtClean="0"/>
-              <a:t>10/24/2019</a:t>
+              <a:t>11/18/2019</a:t>
             </a:fld>
             <a:endParaRPr lang="en-US"/>
           </a:p>
@@ -3183,7 +3183,7 @@
           <a:p>
             <a:fld id="{AE374B5B-21A0-4192-BF4C-38187F1A68D8}" type="datetime1">
               <a:rPr lang="en-US" smtClean="0"/>
-              <a:t>10/24/2019</a:t>
+              <a:t>11/18/2019</a:t>
             </a:fld>
             <a:endParaRPr lang="en-US"/>
           </a:p>
@@ -5524,7 +5524,7 @@
           <a:p>
             <a:fld id="{33B5CF7C-B333-48E1-A4A6-83A3C8B73AC0}" type="datetime1">
               <a:rPr lang="en-US" smtClean="0"/>
-              <a:t>10/24/2019</a:t>
+              <a:t>11/18/2019</a:t>
             </a:fld>
             <a:endParaRPr lang="en-US"/>
           </a:p>
@@ -5977,7 +5977,7 @@
           <a:p>
             <a:fld id="{AE320762-5CBF-4210-AB54-376B091119F8}" type="datetime1">
               <a:rPr lang="en-US" smtClean="0"/>
-              <a:t>10/24/2019</a:t>
+              <a:t>11/18/2019</a:t>
             </a:fld>
             <a:endParaRPr lang="en-US"/>
           </a:p>
@@ -6109,7 +6109,7 @@
           <a:p>
             <a:fld id="{7F0DB371-BF5F-4058-A212-1A908E4D2674}" type="datetime1">
               <a:rPr lang="en-US" smtClean="0"/>
-              <a:t>10/24/2019</a:t>
+              <a:t>11/18/2019</a:t>
             </a:fld>
             <a:endParaRPr lang="en-US"/>
           </a:p>
@@ -8042,7 +8042,7 @@
           <a:p>
             <a:fld id="{60A4083B-90AA-48CF-BAD5-00AA24D7F288}" type="datetime1">
               <a:rPr lang="en-US" smtClean="0"/>
-              <a:t>10/24/2019</a:t>
+              <a:t>11/18/2019</a:t>
             </a:fld>
             <a:endParaRPr lang="en-US"/>
           </a:p>
@@ -10301,7 +10301,7 @@
             <a:fld id="{F5BAF629-ECA2-4CF3-B790-9D9BDED98269}" type="datetime1">
               <a:rPr lang="en-US" smtClean="0"/>
               <a:pPr/>
-              <a:t>10/24/2019</a:t>
+              <a:t>11/18/2019</a:t>
             </a:fld>
             <a:endParaRPr lang="en-US"/>
           </a:p>
@@ -14596,7 +14596,7 @@
             <a:fld id="{B51B2453-8663-4C69-AF73-9FD7B1DEC5D0}" type="datetime1">
               <a:rPr lang="en-US" smtClean="0"/>
               <a:pPr/>
-              <a:t>10/24/2019</a:t>
+              <a:t>11/18/2019</a:t>
             </a:fld>
             <a:endParaRPr lang="en-US" dirty="0"/>
           </a:p>
@@ -18247,7 +18247,7 @@
           <p:spPr>
             <a:xfrm>
               <a:off x="3955441" y="4599801"/>
-              <a:ext cx="585417" cy="276999"/>
+              <a:ext cx="628698" cy="276999"/>
             </a:xfrm>
             <a:prstGeom prst="rect">
               <a:avLst/>
@@ -18266,7 +18266,7 @@
                     <a:schemeClr val="bg1"/>
                   </a:solidFill>
                 </a:rPr>
-                <a:t>USB1</a:t>
+                <a:t>USB 1</a:t>
               </a:r>
               <a:endParaRPr lang="en-US" dirty="0">
                 <a:solidFill>
@@ -18324,7 +18324,7 @@
             <a:pPr algn="ctr"/>
             <a:r>
               <a:rPr lang="en-US" dirty="0"/>
-              <a:t>USB Audio Adapter</a:t>
+              <a:t>Speaker</a:t>
             </a:r>
           </a:p>
         </p:txBody>
@@ -18347,8 +18347,8 @@
         </p:nvCxnSpPr>
         <p:spPr>
           <a:xfrm rot="10800000">
-            <a:off x="4248150" y="4876800"/>
-            <a:ext cx="2647950" cy="342892"/>
+            <a:off x="4269790" y="4876800"/>
+            <a:ext cx="2626310" cy="342892"/>
           </a:xfrm>
           <a:prstGeom prst="bentConnector2">
             <a:avLst/>
@@ -18519,7 +18519,6 @@
           <p:cNvCxnSpPr>
             <a:cxnSpLocks/>
             <a:stCxn id="21" idx="2"/>
-            <a:endCxn id="30" idx="2"/>
           </p:cNvCxnSpPr>
           <p:nvPr/>
         </p:nvCxnSpPr>
@@ -18628,58 +18627,6 @@
           </a:fontRef>
         </p:style>
       </p:cxnSp>
-      <p:sp>
-        <p:nvSpPr>
-          <p:cNvPr id="30" name="Rectangle: Rounded Corners 29">
-            <a:extLst>
-              <a:ext uri="{FF2B5EF4-FFF2-40B4-BE49-F238E27FC236}">
-                <a16:creationId xmlns:a16="http://schemas.microsoft.com/office/drawing/2014/main" id="{9FBABBC3-064E-41E7-B2B6-C0819164D29B}"/>
-              </a:ext>
-            </a:extLst>
-          </p:cNvPr>
-          <p:cNvSpPr/>
-          <p:nvPr/>
-        </p:nvSpPr>
-        <p:spPr>
-          <a:xfrm>
-            <a:off x="1419225" y="4781554"/>
-            <a:ext cx="1485900" cy="533384"/>
-          </a:xfrm>
-          <a:prstGeom prst="roundRect">
-            <a:avLst/>
-          </a:prstGeom>
-          <a:solidFill>
-            <a:srgbClr val="FFC000"/>
-          </a:solidFill>
-        </p:spPr>
-        <p:style>
-          <a:lnRef idx="2">
-            <a:schemeClr val="accent1">
-              <a:shade val="50000"/>
-            </a:schemeClr>
-          </a:lnRef>
-          <a:fillRef idx="1">
-            <a:schemeClr val="accent1"/>
-          </a:fillRef>
-          <a:effectRef idx="0">
-            <a:schemeClr val="accent1"/>
-          </a:effectRef>
-          <a:fontRef idx="minor">
-            <a:schemeClr val="lt1"/>
-          </a:fontRef>
-        </p:style>
-        <p:txBody>
-          <a:bodyPr rtlCol="0" anchor="ctr"/>
-          <a:lstStyle/>
-          <a:p>
-            <a:pPr algn="ctr"/>
-            <a:r>
-              <a:rPr lang="en-US" dirty="0"/>
-              <a:t>Resistor Divider</a:t>
-            </a:r>
-          </a:p>
-        </p:txBody>
-      </p:sp>
       <p:cxnSp>
         <p:nvCxnSpPr>
           <p:cNvPr id="25" name="Connector: Elbow 24">
@@ -18690,15 +18637,15 @@
             </a:extLst>
           </p:cNvPr>
           <p:cNvCxnSpPr>
-            <a:stCxn id="30" idx="0"/>
+            <a:cxnSpLocks/>
             <a:endCxn id="58" idx="1"/>
           </p:cNvCxnSpPr>
           <p:nvPr/>
         </p:nvCxnSpPr>
         <p:spPr>
           <a:xfrm rot="5400000" flipH="1" flipV="1">
-            <a:off x="2309809" y="4043364"/>
-            <a:ext cx="590556" cy="885824"/>
+            <a:off x="2043117" y="4310057"/>
+            <a:ext cx="1123941" cy="885824"/>
           </a:xfrm>
           <a:prstGeom prst="bentConnector2">
             <a:avLst/>

</xml_diff>